<commit_message>
cnn and cifar started
</commit_message>
<xml_diff>
--- a/Docs/Progress slides.pptx
+++ b/Docs/Progress slides.pptx
@@ -256,7 +256,7 @@
           <a:p>
             <a:fld id="{8D2E760F-CC1E-4233-984A-FEB50F5CF30D}" type="datetimeFigureOut">
               <a:rPr lang="en-US" smtClean="0"/>
-              <a:t>2/28/18</a:t>
+              <a:t>3/8/18</a:t>
             </a:fld>
             <a:endParaRPr lang="en-US"/>
           </a:p>
@@ -424,7 +424,7 @@
           <a:p>
             <a:fld id="{8D2E760F-CC1E-4233-984A-FEB50F5CF30D}" type="datetimeFigureOut">
               <a:rPr lang="en-US" smtClean="0"/>
-              <a:t>2/28/18</a:t>
+              <a:t>3/8/18</a:t>
             </a:fld>
             <a:endParaRPr lang="en-US"/>
           </a:p>
@@ -602,7 +602,7 @@
           <a:p>
             <a:fld id="{8D2E760F-CC1E-4233-984A-FEB50F5CF30D}" type="datetimeFigureOut">
               <a:rPr lang="en-US" smtClean="0"/>
-              <a:t>2/28/18</a:t>
+              <a:t>3/8/18</a:t>
             </a:fld>
             <a:endParaRPr lang="en-US"/>
           </a:p>
@@ -770,7 +770,7 @@
           <a:p>
             <a:fld id="{8D2E760F-CC1E-4233-984A-FEB50F5CF30D}" type="datetimeFigureOut">
               <a:rPr lang="en-US" smtClean="0"/>
-              <a:t>2/28/18</a:t>
+              <a:t>3/8/18</a:t>
             </a:fld>
             <a:endParaRPr lang="en-US"/>
           </a:p>
@@ -1015,7 +1015,7 @@
           <a:p>
             <a:fld id="{8D2E760F-CC1E-4233-984A-FEB50F5CF30D}" type="datetimeFigureOut">
               <a:rPr lang="en-US" smtClean="0"/>
-              <a:t>2/28/18</a:t>
+              <a:t>3/8/18</a:t>
             </a:fld>
             <a:endParaRPr lang="en-US"/>
           </a:p>
@@ -1244,7 +1244,7 @@
           <a:p>
             <a:fld id="{8D2E760F-CC1E-4233-984A-FEB50F5CF30D}" type="datetimeFigureOut">
               <a:rPr lang="en-US" smtClean="0"/>
-              <a:t>2/28/18</a:t>
+              <a:t>3/8/18</a:t>
             </a:fld>
             <a:endParaRPr lang="en-US"/>
           </a:p>
@@ -1608,7 +1608,7 @@
           <a:p>
             <a:fld id="{8D2E760F-CC1E-4233-984A-FEB50F5CF30D}" type="datetimeFigureOut">
               <a:rPr lang="en-US" smtClean="0"/>
-              <a:t>2/28/18</a:t>
+              <a:t>3/8/18</a:t>
             </a:fld>
             <a:endParaRPr lang="en-US"/>
           </a:p>
@@ -1725,7 +1725,7 @@
           <a:p>
             <a:fld id="{8D2E760F-CC1E-4233-984A-FEB50F5CF30D}" type="datetimeFigureOut">
               <a:rPr lang="en-US" smtClean="0"/>
-              <a:t>2/28/18</a:t>
+              <a:t>3/8/18</a:t>
             </a:fld>
             <a:endParaRPr lang="en-US"/>
           </a:p>
@@ -1820,7 +1820,7 @@
           <a:p>
             <a:fld id="{8D2E760F-CC1E-4233-984A-FEB50F5CF30D}" type="datetimeFigureOut">
               <a:rPr lang="en-US" smtClean="0"/>
-              <a:t>2/28/18</a:t>
+              <a:t>3/8/18</a:t>
             </a:fld>
             <a:endParaRPr lang="en-US"/>
           </a:p>
@@ -2095,7 +2095,7 @@
           <a:p>
             <a:fld id="{8D2E760F-CC1E-4233-984A-FEB50F5CF30D}" type="datetimeFigureOut">
               <a:rPr lang="en-US" smtClean="0"/>
-              <a:t>2/28/18</a:t>
+              <a:t>3/8/18</a:t>
             </a:fld>
             <a:endParaRPr lang="en-US"/>
           </a:p>
@@ -2347,7 +2347,7 @@
           <a:p>
             <a:fld id="{8D2E760F-CC1E-4233-984A-FEB50F5CF30D}" type="datetimeFigureOut">
               <a:rPr lang="en-US" smtClean="0"/>
-              <a:t>2/28/18</a:t>
+              <a:t>3/8/18</a:t>
             </a:fld>
             <a:endParaRPr lang="en-US"/>
           </a:p>
@@ -2558,7 +2558,7 @@
           <a:p>
             <a:fld id="{8D2E760F-CC1E-4233-984A-FEB50F5CF30D}" type="datetimeFigureOut">
               <a:rPr lang="en-US" smtClean="0"/>
-              <a:t>2/28/18</a:t>
+              <a:t>3/8/18</a:t>
             </a:fld>
             <a:endParaRPr lang="en-US"/>
           </a:p>
@@ -4441,7 +4441,7 @@
             <p:ph idx="1"/>
             <p:extLst>
               <p:ext uri="{D42A27DB-BD31-4B8C-83A1-F6EECF244321}">
-                <p14:modId xmlns:p14="http://schemas.microsoft.com/office/powerpoint/2010/main" val="585143206"/>
+                <p14:modId xmlns:p14="http://schemas.microsoft.com/office/powerpoint/2010/main" val="167447062"/>
               </p:ext>
             </p:extLst>
           </p:nvPr>
@@ -4580,9 +4580,10 @@
                     <a:lstStyle/>
                     <a:p>
                       <a:r>
-                        <a:rPr lang="en-US" dirty="0"/>
-                        <a:t>02.28</a:t>
+                        <a:rPr lang="en-US"/>
+                        <a:t>02.28 with Luca</a:t>
                       </a:r>
+                      <a:endParaRPr lang="en-US" dirty="0"/>
                     </a:p>
                   </a:txBody>
                   <a:tcPr/>
@@ -6398,7 +6399,7 @@
           <a:p>
             <a:r>
               <a:rPr lang="en-US" dirty="0"/>
-              <a:t>Validation (?)</a:t>
+              <a:t>Pros and Cons</a:t>
             </a:r>
           </a:p>
         </p:txBody>
@@ -6424,7 +6425,16 @@
           <a:bodyPr/>
           <a:lstStyle/>
           <a:p>
-            <a:endParaRPr lang="en-US"/>
+            <a:r>
+              <a:rPr lang="en-US" dirty="0"/>
+              <a:t>Computationally more efficient</a:t>
+            </a:r>
+          </a:p>
+          <a:p>
+            <a:r>
+              <a:rPr lang="en-US" dirty="0"/>
+              <a:t>Not necessarily guaranteed to always change image (?)</a:t>
+            </a:r>
           </a:p>
         </p:txBody>
       </p:sp>

</xml_diff>

<commit_message>
random comments for further work
</commit_message>
<xml_diff>
--- a/Docs/Progress slides.pptx
+++ b/Docs/Progress slides.pptx
@@ -12,15 +12,19 @@
     <p:sldId id="270" r:id="rId6"/>
     <p:sldId id="271" r:id="rId7"/>
     <p:sldId id="272" r:id="rId8"/>
-    <p:sldId id="258" r:id="rId9"/>
-    <p:sldId id="259" r:id="rId10"/>
-    <p:sldId id="262" r:id="rId11"/>
-    <p:sldId id="266" r:id="rId12"/>
-    <p:sldId id="260" r:id="rId13"/>
-    <p:sldId id="263" r:id="rId14"/>
-    <p:sldId id="264" r:id="rId15"/>
-    <p:sldId id="265" r:id="rId16"/>
-    <p:sldId id="267" r:id="rId17"/>
+    <p:sldId id="273" r:id="rId9"/>
+    <p:sldId id="274" r:id="rId10"/>
+    <p:sldId id="275" r:id="rId11"/>
+    <p:sldId id="276" r:id="rId12"/>
+    <p:sldId id="258" r:id="rId13"/>
+    <p:sldId id="259" r:id="rId14"/>
+    <p:sldId id="262" r:id="rId15"/>
+    <p:sldId id="266" r:id="rId16"/>
+    <p:sldId id="260" r:id="rId17"/>
+    <p:sldId id="263" r:id="rId18"/>
+    <p:sldId id="264" r:id="rId19"/>
+    <p:sldId id="265" r:id="rId20"/>
+    <p:sldId id="267" r:id="rId21"/>
   </p:sldIdLst>
   <p:sldSz cx="12192000" cy="6858000"/>
   <p:notesSz cx="6858000" cy="9144000"/>
@@ -3082,6 +3086,733 @@
       </p:grpSpPr>
       <p:sp>
         <p:nvSpPr>
+          <p:cNvPr id="2" name="Title 1">
+            <a:extLst>
+              <a:ext uri="{FF2B5EF4-FFF2-40B4-BE49-F238E27FC236}">
+                <a16:creationId xmlns:a16="http://schemas.microsoft.com/office/drawing/2014/main" id="{ECB17E02-01C7-C648-897F-0CEB5DD5D39C}"/>
+              </a:ext>
+            </a:extLst>
+          </p:cNvPr>
+          <p:cNvSpPr>
+            <a:spLocks noGrp="1"/>
+          </p:cNvSpPr>
+          <p:nvPr>
+            <p:ph type="title"/>
+          </p:nvPr>
+        </p:nvSpPr>
+        <p:spPr/>
+        <p:txBody>
+          <a:bodyPr/>
+          <a:lstStyle/>
+          <a:p>
+            <a:r>
+              <a:rPr lang="en-US" dirty="0"/>
+              <a:t>How </a:t>
+            </a:r>
+            <a:r>
+              <a:rPr lang="en-US" dirty="0" err="1"/>
+              <a:t>DeepFool</a:t>
+            </a:r>
+            <a:r>
+              <a:rPr lang="en-US" dirty="0"/>
+              <a:t> works</a:t>
+            </a:r>
+          </a:p>
+        </p:txBody>
+      </p:sp>
+      <p:sp>
+        <p:nvSpPr>
+          <p:cNvPr id="3" name="Content Placeholder 2">
+            <a:extLst>
+              <a:ext uri="{FF2B5EF4-FFF2-40B4-BE49-F238E27FC236}">
+                <a16:creationId xmlns:a16="http://schemas.microsoft.com/office/drawing/2014/main" id="{8841D3C1-AD72-894D-916D-98948E126588}"/>
+              </a:ext>
+            </a:extLst>
+          </p:cNvPr>
+          <p:cNvSpPr>
+            <a:spLocks noGrp="1"/>
+          </p:cNvSpPr>
+          <p:nvPr>
+            <p:ph idx="1"/>
+          </p:nvPr>
+        </p:nvSpPr>
+        <p:spPr/>
+        <p:txBody>
+          <a:bodyPr/>
+          <a:lstStyle/>
+          <a:p>
+            <a:endParaRPr lang="en-US"/>
+          </a:p>
+        </p:txBody>
+      </p:sp>
+    </p:spTree>
+    <p:extLst>
+      <p:ext uri="{BB962C8B-B14F-4D97-AF65-F5344CB8AC3E}">
+        <p14:creationId xmlns:p14="http://schemas.microsoft.com/office/powerpoint/2010/main" val="98500982"/>
+      </p:ext>
+    </p:extLst>
+  </p:cSld>
+  <p:clrMapOvr>
+    <a:masterClrMapping/>
+  </p:clrMapOvr>
+</p:sld>
+</file>
+
+<file path=ppt/slides/slide11.xml><?xml version="1.0" encoding="utf-8"?>
+<p:sld xmlns:a="http://schemas.openxmlformats.org/drawingml/2006/main" xmlns:r="http://schemas.openxmlformats.org/officeDocument/2006/relationships" xmlns:p="http://schemas.openxmlformats.org/presentationml/2006/main">
+  <p:cSld>
+    <p:spTree>
+      <p:nvGrpSpPr>
+        <p:cNvPr id="1" name=""/>
+        <p:cNvGrpSpPr/>
+        <p:nvPr/>
+      </p:nvGrpSpPr>
+      <p:grpSpPr>
+        <a:xfrm>
+          <a:off x="0" y="0"/>
+          <a:ext cx="0" cy="0"/>
+          <a:chOff x="0" y="0"/>
+          <a:chExt cx="0" cy="0"/>
+        </a:xfrm>
+      </p:grpSpPr>
+      <p:sp>
+        <p:nvSpPr>
+          <p:cNvPr id="2" name="Title 1">
+            <a:extLst>
+              <a:ext uri="{FF2B5EF4-FFF2-40B4-BE49-F238E27FC236}">
+                <a16:creationId xmlns:a16="http://schemas.microsoft.com/office/drawing/2014/main" id="{493EB65C-5800-184B-97F6-0EC72C7D87C2}"/>
+              </a:ext>
+            </a:extLst>
+          </p:cNvPr>
+          <p:cNvSpPr>
+            <a:spLocks noGrp="1"/>
+          </p:cNvSpPr>
+          <p:nvPr>
+            <p:ph type="title"/>
+          </p:nvPr>
+        </p:nvSpPr>
+        <p:spPr/>
+        <p:txBody>
+          <a:bodyPr/>
+          <a:lstStyle/>
+          <a:p>
+            <a:r>
+              <a:rPr lang="en-US" dirty="0"/>
+              <a:t>How did the adversarial distortion work</a:t>
+            </a:r>
+          </a:p>
+        </p:txBody>
+      </p:sp>
+      <p:sp>
+        <p:nvSpPr>
+          <p:cNvPr id="3" name="Content Placeholder 2">
+            <a:extLst>
+              <a:ext uri="{FF2B5EF4-FFF2-40B4-BE49-F238E27FC236}">
+                <a16:creationId xmlns:a16="http://schemas.microsoft.com/office/drawing/2014/main" id="{1FBCFFAE-F0B2-4644-95B4-FDD3F243A025}"/>
+              </a:ext>
+            </a:extLst>
+          </p:cNvPr>
+          <p:cNvSpPr>
+            <a:spLocks noGrp="1"/>
+          </p:cNvSpPr>
+          <p:nvPr>
+            <p:ph idx="1"/>
+          </p:nvPr>
+        </p:nvSpPr>
+        <p:spPr/>
+        <p:txBody>
+          <a:bodyPr/>
+          <a:lstStyle/>
+          <a:p>
+            <a:r>
+              <a:rPr lang="en-US" dirty="0"/>
+              <a:t>Have a table like slide 16 </a:t>
+            </a:r>
+            <a:r>
+              <a:rPr lang="en-US"/>
+              <a:t>or image</a:t>
+            </a:r>
+            <a:endParaRPr lang="en-US" dirty="0"/>
+          </a:p>
+        </p:txBody>
+      </p:sp>
+      <p:sp>
+        <p:nvSpPr>
+          <p:cNvPr id="4" name="TextBox 3">
+            <a:extLst>
+              <a:ext uri="{FF2B5EF4-FFF2-40B4-BE49-F238E27FC236}">
+                <a16:creationId xmlns:a16="http://schemas.microsoft.com/office/drawing/2014/main" id="{029C2145-84E1-2549-AEEF-2981EBF6F580}"/>
+              </a:ext>
+            </a:extLst>
+          </p:cNvPr>
+          <p:cNvSpPr txBox="1"/>
+          <p:nvPr/>
+        </p:nvSpPr>
+        <p:spPr>
+          <a:xfrm>
+            <a:off x="3028208" y="2078182"/>
+            <a:ext cx="184731" cy="369332"/>
+          </a:xfrm>
+          <a:prstGeom prst="rect">
+            <a:avLst/>
+          </a:prstGeom>
+          <a:noFill/>
+        </p:spPr>
+        <p:txBody>
+          <a:bodyPr wrap="none" rtlCol="0">
+            <a:spAutoFit/>
+          </a:bodyPr>
+          <a:lstStyle/>
+          <a:p>
+            <a:endParaRPr lang="en-US" dirty="0"/>
+          </a:p>
+        </p:txBody>
+      </p:sp>
+    </p:spTree>
+    <p:extLst>
+      <p:ext uri="{BB962C8B-B14F-4D97-AF65-F5344CB8AC3E}">
+        <p14:creationId xmlns:p14="http://schemas.microsoft.com/office/powerpoint/2010/main" val="3313149022"/>
+      </p:ext>
+    </p:extLst>
+  </p:cSld>
+  <p:clrMapOvr>
+    <a:masterClrMapping/>
+  </p:clrMapOvr>
+</p:sld>
+</file>
+
+<file path=ppt/slides/slide12.xml><?xml version="1.0" encoding="utf-8"?>
+<p:sld xmlns:a="http://schemas.openxmlformats.org/drawingml/2006/main" xmlns:r="http://schemas.openxmlformats.org/officeDocument/2006/relationships" xmlns:p="http://schemas.openxmlformats.org/presentationml/2006/main">
+  <p:cSld>
+    <p:spTree>
+      <p:nvGrpSpPr>
+        <p:cNvPr id="1" name=""/>
+        <p:cNvGrpSpPr/>
+        <p:nvPr/>
+      </p:nvGrpSpPr>
+      <p:grpSpPr>
+        <a:xfrm>
+          <a:off x="0" y="0"/>
+          <a:ext cx="0" cy="0"/>
+          <a:chOff x="0" y="0"/>
+          <a:chExt cx="0" cy="0"/>
+        </a:xfrm>
+      </p:grpSpPr>
+      <p:sp>
+        <p:nvSpPr>
+          <p:cNvPr id="2" name="Title 1"/>
+          <p:cNvSpPr>
+            <a:spLocks noGrp="1"/>
+          </p:cNvSpPr>
+          <p:nvPr>
+            <p:ph type="title"/>
+          </p:nvPr>
+        </p:nvSpPr>
+        <p:spPr/>
+        <p:txBody>
+          <a:bodyPr/>
+          <a:lstStyle/>
+          <a:p>
+            <a:r>
+              <a:rPr lang="en-US" dirty="0"/>
+              <a:t>Methods Summary</a:t>
+            </a:r>
+          </a:p>
+        </p:txBody>
+      </p:sp>
+      <p:sp>
+        <p:nvSpPr>
+          <p:cNvPr id="4" name="Text Placeholder 3"/>
+          <p:cNvSpPr>
+            <a:spLocks noGrp="1"/>
+          </p:cNvSpPr>
+          <p:nvPr>
+            <p:ph type="body" idx="1"/>
+          </p:nvPr>
+        </p:nvSpPr>
+        <p:spPr/>
+        <p:txBody>
+          <a:bodyPr/>
+          <a:lstStyle/>
+          <a:p>
+            <a:r>
+              <a:rPr lang="en-US" dirty="0"/>
+              <a:t>1. </a:t>
+            </a:r>
+            <a:r>
+              <a:rPr lang="en-US" dirty="0" err="1"/>
+              <a:t>DeepFool</a:t>
+            </a:r>
+            <a:endParaRPr lang="en-US" dirty="0"/>
+          </a:p>
+        </p:txBody>
+      </p:sp>
+      <p:sp>
+        <p:nvSpPr>
+          <p:cNvPr id="5" name="Content Placeholder 4"/>
+          <p:cNvSpPr>
+            <a:spLocks noGrp="1"/>
+          </p:cNvSpPr>
+          <p:nvPr>
+            <p:ph sz="half" idx="2"/>
+          </p:nvPr>
+        </p:nvSpPr>
+        <p:spPr/>
+        <p:txBody>
+          <a:bodyPr>
+            <a:normAutofit lnSpcReduction="10000"/>
+          </a:bodyPr>
+          <a:lstStyle/>
+          <a:p>
+            <a:r>
+              <a:rPr lang="en-US" dirty="0">
+                <a:solidFill>
+                  <a:srgbClr val="FF0000"/>
+                </a:solidFill>
+              </a:rPr>
+              <a:t>Idea:</a:t>
+            </a:r>
+          </a:p>
+          <a:p>
+            <a:r>
+              <a:rPr lang="en-US" dirty="0"/>
+              <a:t>Paper:</a:t>
+            </a:r>
+          </a:p>
+          <a:p>
+            <a:pPr lvl="1"/>
+            <a:r>
+              <a:rPr lang="en-US" dirty="0"/>
+              <a:t>A simple and accurate method to fool deep neural networks</a:t>
+            </a:r>
+          </a:p>
+          <a:p>
+            <a:pPr lvl="1"/>
+            <a:r>
+              <a:rPr lang="en-US" dirty="0"/>
+              <a:t>https://arxiv.org/abs/1511.04599</a:t>
+            </a:r>
+          </a:p>
+          <a:p>
+            <a:r>
+              <a:rPr lang="en-US" dirty="0"/>
+              <a:t>Code:</a:t>
+            </a:r>
+          </a:p>
+          <a:p>
+            <a:pPr lvl="1"/>
+            <a:r>
+              <a:rPr lang="en-US" dirty="0">
+                <a:hlinkClick r:id="rId2"/>
+              </a:rPr>
+              <a:t>https://github.com/LTS4/DeepFool</a:t>
+            </a:r>
+            <a:endParaRPr lang="en-US" dirty="0"/>
+          </a:p>
+          <a:p>
+            <a:pPr lvl="1"/>
+            <a:r>
+              <a:rPr lang="en-US" dirty="0" err="1"/>
+              <a:t>Pytorch</a:t>
+            </a:r>
+            <a:endParaRPr lang="en-US" dirty="0"/>
+          </a:p>
+        </p:txBody>
+      </p:sp>
+      <p:sp>
+        <p:nvSpPr>
+          <p:cNvPr id="6" name="Text Placeholder 5"/>
+          <p:cNvSpPr>
+            <a:spLocks noGrp="1"/>
+          </p:cNvSpPr>
+          <p:nvPr>
+            <p:ph type="body" sz="quarter" idx="3"/>
+          </p:nvPr>
+        </p:nvSpPr>
+        <p:spPr/>
+        <p:txBody>
+          <a:bodyPr/>
+          <a:lstStyle/>
+          <a:p>
+            <a:r>
+              <a:rPr lang="en-US" dirty="0"/>
+              <a:t>2. Fast Gradient Sign Method (FGSM)</a:t>
+            </a:r>
+          </a:p>
+        </p:txBody>
+      </p:sp>
+      <p:sp>
+        <p:nvSpPr>
+          <p:cNvPr id="7" name="Content Placeholder 6"/>
+          <p:cNvSpPr>
+            <a:spLocks noGrp="1"/>
+          </p:cNvSpPr>
+          <p:nvPr>
+            <p:ph sz="quarter" idx="4"/>
+          </p:nvPr>
+        </p:nvSpPr>
+        <p:spPr/>
+        <p:txBody>
+          <a:bodyPr>
+            <a:normAutofit lnSpcReduction="10000"/>
+          </a:bodyPr>
+          <a:lstStyle/>
+          <a:p>
+            <a:r>
+              <a:rPr lang="en-US" dirty="0">
+                <a:solidFill>
+                  <a:srgbClr val="FF0000"/>
+                </a:solidFill>
+              </a:rPr>
+              <a:t>Idea:</a:t>
+            </a:r>
+          </a:p>
+          <a:p>
+            <a:r>
+              <a:rPr lang="en-US" dirty="0"/>
+              <a:t>Paper:</a:t>
+            </a:r>
+          </a:p>
+          <a:p>
+            <a:pPr lvl="1"/>
+            <a:r>
+              <a:rPr lang="en-US" dirty="0"/>
+              <a:t>Explaining and Harnessing Adversarial Examples</a:t>
+            </a:r>
+          </a:p>
+          <a:p>
+            <a:pPr lvl="1"/>
+            <a:r>
+              <a:rPr lang="en-US" dirty="0"/>
+              <a:t>https://arxiv.org/abs/1412.6572</a:t>
+            </a:r>
+          </a:p>
+          <a:p>
+            <a:r>
+              <a:rPr lang="en-US" dirty="0"/>
+              <a:t>Code:</a:t>
+            </a:r>
+          </a:p>
+          <a:p>
+            <a:pPr lvl="1"/>
+            <a:r>
+              <a:rPr lang="en-US" dirty="0"/>
+              <a:t>https://github.com/gongzhitaao/tensorflow-adversarial</a:t>
+            </a:r>
+          </a:p>
+          <a:p>
+            <a:pPr lvl="1"/>
+            <a:r>
+              <a:rPr lang="en-US" dirty="0" err="1"/>
+              <a:t>Tensorflow</a:t>
+            </a:r>
+            <a:endParaRPr lang="en-US" dirty="0"/>
+          </a:p>
+          <a:p>
+            <a:pPr lvl="1"/>
+            <a:endParaRPr lang="en-US" dirty="0"/>
+          </a:p>
+        </p:txBody>
+      </p:sp>
+    </p:spTree>
+    <p:extLst>
+      <p:ext uri="{BB962C8B-B14F-4D97-AF65-F5344CB8AC3E}">
+        <p14:creationId xmlns:p14="http://schemas.microsoft.com/office/powerpoint/2010/main" val="3202584400"/>
+      </p:ext>
+    </p:extLst>
+  </p:cSld>
+  <p:clrMapOvr>
+    <a:masterClrMapping/>
+  </p:clrMapOvr>
+</p:sld>
+</file>
+
+<file path=ppt/slides/slide13.xml><?xml version="1.0" encoding="utf-8"?>
+<p:sld xmlns:a="http://schemas.openxmlformats.org/drawingml/2006/main" xmlns:r="http://schemas.openxmlformats.org/officeDocument/2006/relationships" xmlns:p="http://schemas.openxmlformats.org/presentationml/2006/main">
+  <p:cSld>
+    <p:spTree>
+      <p:nvGrpSpPr>
+        <p:cNvPr id="1" name=""/>
+        <p:cNvGrpSpPr/>
+        <p:nvPr/>
+      </p:nvGrpSpPr>
+      <p:grpSpPr>
+        <a:xfrm>
+          <a:off x="0" y="0"/>
+          <a:ext cx="0" cy="0"/>
+          <a:chOff x="0" y="0"/>
+          <a:chExt cx="0" cy="0"/>
+        </a:xfrm>
+      </p:grpSpPr>
+      <p:sp>
+        <p:nvSpPr>
+          <p:cNvPr id="2" name="Title 1"/>
+          <p:cNvSpPr>
+            <a:spLocks noGrp="1"/>
+          </p:cNvSpPr>
+          <p:nvPr>
+            <p:ph type="title"/>
+          </p:nvPr>
+        </p:nvSpPr>
+        <p:spPr/>
+        <p:txBody>
+          <a:bodyPr/>
+          <a:lstStyle/>
+          <a:p>
+            <a:r>
+              <a:rPr lang="en-US" dirty="0"/>
+              <a:t>Methods Summary</a:t>
+            </a:r>
+          </a:p>
+        </p:txBody>
+      </p:sp>
+      <p:sp>
+        <p:nvSpPr>
+          <p:cNvPr id="4" name="Text Placeholder 3"/>
+          <p:cNvSpPr>
+            <a:spLocks noGrp="1"/>
+          </p:cNvSpPr>
+          <p:nvPr>
+            <p:ph type="body" idx="1"/>
+          </p:nvPr>
+        </p:nvSpPr>
+        <p:spPr/>
+        <p:txBody>
+          <a:bodyPr/>
+          <a:lstStyle/>
+          <a:p>
+            <a:r>
+              <a:rPr lang="en-US" dirty="0"/>
+              <a:t>3. Iterative FGSM</a:t>
+            </a:r>
+          </a:p>
+        </p:txBody>
+      </p:sp>
+      <p:sp>
+        <p:nvSpPr>
+          <p:cNvPr id="5" name="Content Placeholder 4"/>
+          <p:cNvSpPr>
+            <a:spLocks noGrp="1"/>
+          </p:cNvSpPr>
+          <p:nvPr>
+            <p:ph sz="half" idx="2"/>
+          </p:nvPr>
+        </p:nvSpPr>
+        <p:spPr/>
+        <p:txBody>
+          <a:bodyPr>
+            <a:normAutofit fontScale="92500" lnSpcReduction="10000"/>
+          </a:bodyPr>
+          <a:lstStyle/>
+          <a:p>
+            <a:r>
+              <a:rPr lang="en-US" dirty="0">
+                <a:solidFill>
+                  <a:srgbClr val="FF0000"/>
+                </a:solidFill>
+              </a:rPr>
+              <a:t>Idea:</a:t>
+            </a:r>
+          </a:p>
+          <a:p>
+            <a:r>
+              <a:rPr lang="en-US" dirty="0"/>
+              <a:t>Paper:</a:t>
+            </a:r>
+          </a:p>
+          <a:p>
+            <a:pPr lvl="1"/>
+            <a:r>
+              <a:rPr lang="en-US" dirty="0"/>
+              <a:t>Adversarial examples in the physical world</a:t>
+            </a:r>
+          </a:p>
+          <a:p>
+            <a:pPr lvl="1"/>
+            <a:r>
+              <a:rPr lang="en-US" dirty="0"/>
+              <a:t>https://arxiv.org/abs/1607.02533</a:t>
+            </a:r>
+          </a:p>
+          <a:p>
+            <a:r>
+              <a:rPr lang="en-US" dirty="0"/>
+              <a:t>Code:</a:t>
+            </a:r>
+          </a:p>
+          <a:p>
+            <a:pPr lvl="1"/>
+            <a:r>
+              <a:rPr lang="en-US" dirty="0">
+                <a:hlinkClick r:id="rId2"/>
+              </a:rPr>
+              <a:t>https://github.com/gongzhitaao/tensorflow-adversarial</a:t>
+            </a:r>
+            <a:endParaRPr lang="en-US" dirty="0"/>
+          </a:p>
+          <a:p>
+            <a:pPr lvl="1"/>
+            <a:r>
+              <a:rPr lang="en-US" dirty="0"/>
+              <a:t>Write codes based on FGSM</a:t>
+            </a:r>
+          </a:p>
+          <a:p>
+            <a:pPr lvl="1"/>
+            <a:r>
+              <a:rPr lang="en-US" dirty="0" err="1"/>
+              <a:t>Tensorflow</a:t>
+            </a:r>
+            <a:endParaRPr lang="en-US" dirty="0"/>
+          </a:p>
+          <a:p>
+            <a:endParaRPr lang="en-US" dirty="0"/>
+          </a:p>
+        </p:txBody>
+      </p:sp>
+      <p:sp>
+        <p:nvSpPr>
+          <p:cNvPr id="6" name="Text Placeholder 5"/>
+          <p:cNvSpPr>
+            <a:spLocks noGrp="1"/>
+          </p:cNvSpPr>
+          <p:nvPr>
+            <p:ph type="body" sz="quarter" idx="3"/>
+          </p:nvPr>
+        </p:nvSpPr>
+        <p:spPr/>
+        <p:txBody>
+          <a:bodyPr/>
+          <a:lstStyle/>
+          <a:p>
+            <a:r>
+              <a:rPr lang="en-US" dirty="0"/>
+              <a:t>4. </a:t>
+            </a:r>
+            <a:r>
+              <a:rPr lang="en-US" dirty="0" err="1"/>
+              <a:t>Carlini</a:t>
+            </a:r>
+            <a:r>
+              <a:rPr lang="en-US" dirty="0"/>
+              <a:t> Wagner Attack </a:t>
+            </a:r>
+          </a:p>
+        </p:txBody>
+      </p:sp>
+      <p:sp>
+        <p:nvSpPr>
+          <p:cNvPr id="7" name="Content Placeholder 6"/>
+          <p:cNvSpPr>
+            <a:spLocks noGrp="1"/>
+          </p:cNvSpPr>
+          <p:nvPr>
+            <p:ph sz="quarter" idx="4"/>
+          </p:nvPr>
+        </p:nvSpPr>
+        <p:spPr/>
+        <p:txBody>
+          <a:bodyPr>
+            <a:normAutofit lnSpcReduction="10000"/>
+          </a:bodyPr>
+          <a:lstStyle/>
+          <a:p>
+            <a:r>
+              <a:rPr lang="en-US" dirty="0">
+                <a:solidFill>
+                  <a:srgbClr val="FF0000"/>
+                </a:solidFill>
+              </a:rPr>
+              <a:t>Idea:</a:t>
+            </a:r>
+          </a:p>
+          <a:p>
+            <a:r>
+              <a:rPr lang="en-US" dirty="0"/>
+              <a:t>Paper:</a:t>
+            </a:r>
+          </a:p>
+          <a:p>
+            <a:pPr lvl="1"/>
+            <a:r>
+              <a:rPr lang="en-US" dirty="0"/>
+              <a:t>Towards Evaluating the Robustness of Neural Networks</a:t>
+            </a:r>
+          </a:p>
+          <a:p>
+            <a:pPr lvl="1"/>
+            <a:r>
+              <a:rPr lang="en-US" dirty="0">
+                <a:hlinkClick r:id="rId3"/>
+              </a:rPr>
+              <a:t>https://arxiv.org/abs/1608.04644</a:t>
+            </a:r>
+            <a:endParaRPr lang="en-US" dirty="0"/>
+          </a:p>
+          <a:p>
+            <a:r>
+              <a:rPr lang="en-US" dirty="0"/>
+              <a:t>Code</a:t>
+            </a:r>
+          </a:p>
+          <a:p>
+            <a:pPr lvl="1"/>
+            <a:r>
+              <a:rPr lang="en-US" dirty="0">
+                <a:hlinkClick r:id="rId2"/>
+              </a:rPr>
+              <a:t>https://github.com/gongzhitaao/tensorflow-adversarial</a:t>
+            </a:r>
+            <a:r>
+              <a:rPr lang="en-US" dirty="0"/>
+              <a:t> </a:t>
+            </a:r>
+          </a:p>
+          <a:p>
+            <a:pPr lvl="1"/>
+            <a:r>
+              <a:rPr lang="en-US" dirty="0" err="1"/>
+              <a:t>Tensorflow</a:t>
+            </a:r>
+            <a:r>
+              <a:rPr lang="en-US" dirty="0"/>
+              <a:t> </a:t>
+            </a:r>
+          </a:p>
+        </p:txBody>
+      </p:sp>
+    </p:spTree>
+    <p:extLst>
+      <p:ext uri="{BB962C8B-B14F-4D97-AF65-F5344CB8AC3E}">
+        <p14:creationId xmlns:p14="http://schemas.microsoft.com/office/powerpoint/2010/main" val="285251880"/>
+      </p:ext>
+    </p:extLst>
+  </p:cSld>
+  <p:clrMapOvr>
+    <a:masterClrMapping/>
+  </p:clrMapOvr>
+</p:sld>
+</file>
+
+<file path=ppt/slides/slide14.xml><?xml version="1.0" encoding="utf-8"?>
+<p:sld xmlns:a="http://schemas.openxmlformats.org/drawingml/2006/main" xmlns:r="http://schemas.openxmlformats.org/officeDocument/2006/relationships" xmlns:p="http://schemas.openxmlformats.org/presentationml/2006/main">
+  <p:cSld>
+    <p:spTree>
+      <p:nvGrpSpPr>
+        <p:cNvPr id="1" name=""/>
+        <p:cNvGrpSpPr/>
+        <p:nvPr/>
+      </p:nvGrpSpPr>
+      <p:grpSpPr>
+        <a:xfrm>
+          <a:off x="0" y="0"/>
+          <a:ext cx="0" cy="0"/>
+          <a:chOff x="0" y="0"/>
+          <a:chExt cx="0" cy="0"/>
+        </a:xfrm>
+      </p:grpSpPr>
+      <p:sp>
+        <p:nvSpPr>
           <p:cNvPr id="2" name="Title 1"/>
           <p:cNvSpPr>
             <a:spLocks noGrp="1"/>
@@ -3281,7 +4012,7 @@
 </p:sld>
 </file>
 
-<file path=ppt/slides/slide11.xml><?xml version="1.0" encoding="utf-8"?>
+<file path=ppt/slides/slide15.xml><?xml version="1.0" encoding="utf-8"?>
 <p:sld xmlns:a="http://schemas.openxmlformats.org/drawingml/2006/main" xmlns:r="http://schemas.openxmlformats.org/officeDocument/2006/relationships" xmlns:p="http://schemas.openxmlformats.org/presentationml/2006/main">
   <p:cSld>
     <p:spTree>
@@ -3980,7 +4711,7 @@
 </p:sld>
 </file>
 
-<file path=ppt/slides/slide12.xml><?xml version="1.0" encoding="utf-8"?>
+<file path=ppt/slides/slide16.xml><?xml version="1.0" encoding="utf-8"?>
 <p:sld xmlns:a="http://schemas.openxmlformats.org/drawingml/2006/main" xmlns:r="http://schemas.openxmlformats.org/officeDocument/2006/relationships" xmlns:p="http://schemas.openxmlformats.org/presentationml/2006/main">
   <p:cSld>
     <p:spTree>
@@ -4167,7 +4898,7 @@
 </p:sld>
 </file>
 
-<file path=ppt/slides/slide13.xml><?xml version="1.0" encoding="utf-8"?>
+<file path=ppt/slides/slide17.xml><?xml version="1.0" encoding="utf-8"?>
 <p:sld xmlns:a="http://schemas.openxmlformats.org/drawingml/2006/main" xmlns:r="http://schemas.openxmlformats.org/officeDocument/2006/relationships" xmlns:p="http://schemas.openxmlformats.org/presentationml/2006/main">
   <p:cSld>
     <p:spTree>
@@ -4242,7 +4973,7 @@
 </p:sld>
 </file>
 
-<file path=ppt/slides/slide14.xml><?xml version="1.0" encoding="utf-8"?>
+<file path=ppt/slides/slide18.xml><?xml version="1.0" encoding="utf-8"?>
 <p:sld xmlns:a="http://schemas.openxmlformats.org/drawingml/2006/main" xmlns:r="http://schemas.openxmlformats.org/officeDocument/2006/relationships" xmlns:p="http://schemas.openxmlformats.org/presentationml/2006/main">
   <p:cSld>
     <p:spTree>
@@ -4317,7 +5048,7 @@
 </p:sld>
 </file>
 
-<file path=ppt/slides/slide15.xml><?xml version="1.0" encoding="utf-8"?>
+<file path=ppt/slides/slide19.xml><?xml version="1.0" encoding="utf-8"?>
 <p:sld xmlns:a="http://schemas.openxmlformats.org/drawingml/2006/main" xmlns:r="http://schemas.openxmlformats.org/officeDocument/2006/relationships" xmlns:p="http://schemas.openxmlformats.org/presentationml/2006/main">
   <p:cSld>
     <p:spTree>
@@ -4392,7 +5123,89 @@
 </p:sld>
 </file>
 
-<file path=ppt/slides/slide16.xml><?xml version="1.0" encoding="utf-8"?>
+<file path=ppt/slides/slide2.xml><?xml version="1.0" encoding="utf-8"?>
+<p:sld xmlns:a="http://schemas.openxmlformats.org/drawingml/2006/main" xmlns:r="http://schemas.openxmlformats.org/officeDocument/2006/relationships" xmlns:p="http://schemas.openxmlformats.org/presentationml/2006/main">
+  <p:cSld>
+    <p:spTree>
+      <p:nvGrpSpPr>
+        <p:cNvPr id="1" name=""/>
+        <p:cNvGrpSpPr/>
+        <p:nvPr/>
+      </p:nvGrpSpPr>
+      <p:grpSpPr>
+        <a:xfrm>
+          <a:off x="0" y="0"/>
+          <a:ext cx="0" cy="0"/>
+          <a:chOff x="0" y="0"/>
+          <a:chExt cx="0" cy="0"/>
+        </a:xfrm>
+      </p:grpSpPr>
+      <p:sp>
+        <p:nvSpPr>
+          <p:cNvPr id="2" name="Title 1"/>
+          <p:cNvSpPr>
+            <a:spLocks noGrp="1"/>
+          </p:cNvSpPr>
+          <p:nvPr>
+            <p:ph type="title"/>
+          </p:nvPr>
+        </p:nvSpPr>
+        <p:spPr/>
+        <p:txBody>
+          <a:bodyPr/>
+          <a:lstStyle/>
+          <a:p>
+            <a:r>
+              <a:rPr lang="en-US" dirty="0">
+                <a:solidFill>
+                  <a:srgbClr val="FF0000"/>
+                </a:solidFill>
+              </a:rPr>
+              <a:t>Introductions/Motivations</a:t>
+            </a:r>
+          </a:p>
+        </p:txBody>
+      </p:sp>
+      <p:sp>
+        <p:nvSpPr>
+          <p:cNvPr id="3" name="Content Placeholder 2"/>
+          <p:cNvSpPr>
+            <a:spLocks noGrp="1"/>
+          </p:cNvSpPr>
+          <p:nvPr>
+            <p:ph idx="1"/>
+          </p:nvPr>
+        </p:nvSpPr>
+        <p:spPr/>
+        <p:txBody>
+          <a:bodyPr/>
+          <a:lstStyle/>
+          <a:p>
+            <a:r>
+              <a:rPr lang="en-US" dirty="0">
+                <a:solidFill>
+                  <a:srgbClr val="FF0000"/>
+                </a:solidFill>
+              </a:rPr>
+              <a:t>Try to summarize from the introductions of the papers </a:t>
+            </a:r>
+          </a:p>
+        </p:txBody>
+      </p:sp>
+    </p:spTree>
+    <p:extLst>
+      <p:ext uri="{BB962C8B-B14F-4D97-AF65-F5344CB8AC3E}">
+        <p14:creationId xmlns:p14="http://schemas.microsoft.com/office/powerpoint/2010/main" val="3763483425"/>
+      </p:ext>
+    </p:extLst>
+  </p:cSld>
+  <p:clrMapOvr>
+    <a:masterClrMapping/>
+  </p:clrMapOvr>
+</p:sld>
+</file>
+
+<file path=ppt/slides/slide20.xml><?xml version="1.0" encoding="utf-8"?>
 <p:sld xmlns:a="http://schemas.openxmlformats.org/drawingml/2006/main" xmlns:r="http://schemas.openxmlformats.org/officeDocument/2006/relationships" xmlns:p="http://schemas.openxmlformats.org/presentationml/2006/main">
   <p:cSld>
     <p:spTree>
@@ -4580,10 +5393,9 @@
                     <a:lstStyle/>
                     <a:p>
                       <a:r>
-                        <a:rPr lang="en-US"/>
+                        <a:rPr lang="en-US" dirty="0"/>
                         <a:t>02.28 with Luca</a:t>
                       </a:r>
-                      <a:endParaRPr lang="en-US" dirty="0"/>
                     </a:p>
                   </a:txBody>
                   <a:tcPr/>
@@ -5193,88 +6005,6 @@
 </p:sld>
 </file>
 
-<file path=ppt/slides/slide2.xml><?xml version="1.0" encoding="utf-8"?>
-<p:sld xmlns:a="http://schemas.openxmlformats.org/drawingml/2006/main" xmlns:r="http://schemas.openxmlformats.org/officeDocument/2006/relationships" xmlns:p="http://schemas.openxmlformats.org/presentationml/2006/main">
-  <p:cSld>
-    <p:spTree>
-      <p:nvGrpSpPr>
-        <p:cNvPr id="1" name=""/>
-        <p:cNvGrpSpPr/>
-        <p:nvPr/>
-      </p:nvGrpSpPr>
-      <p:grpSpPr>
-        <a:xfrm>
-          <a:off x="0" y="0"/>
-          <a:ext cx="0" cy="0"/>
-          <a:chOff x="0" y="0"/>
-          <a:chExt cx="0" cy="0"/>
-        </a:xfrm>
-      </p:grpSpPr>
-      <p:sp>
-        <p:nvSpPr>
-          <p:cNvPr id="2" name="Title 1"/>
-          <p:cNvSpPr>
-            <a:spLocks noGrp="1"/>
-          </p:cNvSpPr>
-          <p:nvPr>
-            <p:ph type="title"/>
-          </p:nvPr>
-        </p:nvSpPr>
-        <p:spPr/>
-        <p:txBody>
-          <a:bodyPr/>
-          <a:lstStyle/>
-          <a:p>
-            <a:r>
-              <a:rPr lang="en-US" dirty="0">
-                <a:solidFill>
-                  <a:srgbClr val="FF0000"/>
-                </a:solidFill>
-              </a:rPr>
-              <a:t>Introductions/Motivations</a:t>
-            </a:r>
-          </a:p>
-        </p:txBody>
-      </p:sp>
-      <p:sp>
-        <p:nvSpPr>
-          <p:cNvPr id="3" name="Content Placeholder 2"/>
-          <p:cNvSpPr>
-            <a:spLocks noGrp="1"/>
-          </p:cNvSpPr>
-          <p:nvPr>
-            <p:ph idx="1"/>
-          </p:nvPr>
-        </p:nvSpPr>
-        <p:spPr/>
-        <p:txBody>
-          <a:bodyPr/>
-          <a:lstStyle/>
-          <a:p>
-            <a:r>
-              <a:rPr lang="en-US" dirty="0">
-                <a:solidFill>
-                  <a:srgbClr val="FF0000"/>
-                </a:solidFill>
-              </a:rPr>
-              <a:t>Try to summarize from the introductions of the papers </a:t>
-            </a:r>
-          </a:p>
-        </p:txBody>
-      </p:sp>
-    </p:spTree>
-    <p:extLst>
-      <p:ext uri="{BB962C8B-B14F-4D97-AF65-F5344CB8AC3E}">
-        <p14:creationId xmlns:p14="http://schemas.microsoft.com/office/powerpoint/2010/main" val="3763483425"/>
-      </p:ext>
-    </p:extLst>
-  </p:cSld>
-  <p:clrMapOvr>
-    <a:masterClrMapping/>
-  </p:clrMapOvr>
-</p:sld>
-</file>
-
 <file path=ppt/slides/slide3.xml><?xml version="1.0" encoding="utf-8"?>
 <p:sld xmlns:a="http://schemas.openxmlformats.org/drawingml/2006/main" xmlns:r="http://schemas.openxmlformats.org/officeDocument/2006/relationships" xmlns:p="http://schemas.openxmlformats.org/presentationml/2006/main">
   <p:cSld>
@@ -6436,6 +7166,12 @@
               <a:t>Not necessarily guaranteed to always change image (?)</a:t>
             </a:r>
           </a:p>
+          <a:p>
+            <a:r>
+              <a:rPr lang="en-US" dirty="0"/>
+              <a:t>Doesn’t guarantee minimal perturbation, but pretty small distortion comparatively</a:t>
+            </a:r>
+          </a:p>
         </p:txBody>
       </p:sp>
     </p:spTree>
@@ -6470,7 +7206,13 @@
       </p:grpSpPr>
       <p:sp>
         <p:nvSpPr>
-          <p:cNvPr id="2" name="Title 1"/>
+          <p:cNvPr id="2" name="Title 1">
+            <a:extLst>
+              <a:ext uri="{FF2B5EF4-FFF2-40B4-BE49-F238E27FC236}">
+                <a16:creationId xmlns:a16="http://schemas.microsoft.com/office/drawing/2014/main" id="{154F488B-43F5-E046-BF7E-0056194D383C}"/>
+              </a:ext>
+            </a:extLst>
+          </p:cNvPr>
           <p:cNvSpPr>
             <a:spLocks noGrp="1"/>
           </p:cNvSpPr>
@@ -6485,209 +7227,57 @@
           <a:p>
             <a:r>
               <a:rPr lang="en-US" dirty="0"/>
-              <a:t>Methods Summary</a:t>
-            </a:r>
-          </a:p>
-        </p:txBody>
-      </p:sp>
-      <p:sp>
-        <p:nvSpPr>
-          <p:cNvPr id="4" name="Text Placeholder 3"/>
-          <p:cNvSpPr>
-            <a:spLocks noGrp="1"/>
-          </p:cNvSpPr>
-          <p:nvPr>
-            <p:ph type="body" idx="1"/>
-          </p:nvPr>
-        </p:nvSpPr>
-        <p:spPr/>
-        <p:txBody>
-          <a:bodyPr/>
-          <a:lstStyle/>
-          <a:p>
-            <a:r>
-              <a:rPr lang="en-US" dirty="0"/>
-              <a:t>1. </a:t>
+              <a:t>Need to revise deep fool code by</a:t>
+            </a:r>
+          </a:p>
+        </p:txBody>
+      </p:sp>
+      <p:sp>
+        <p:nvSpPr>
+          <p:cNvPr id="3" name="Content Placeholder 2">
+            <a:extLst>
+              <a:ext uri="{FF2B5EF4-FFF2-40B4-BE49-F238E27FC236}">
+                <a16:creationId xmlns:a16="http://schemas.microsoft.com/office/drawing/2014/main" id="{1CD8EE92-C2C5-5444-B7E1-D8B3730B2F72}"/>
+              </a:ext>
+            </a:extLst>
+          </p:cNvPr>
+          <p:cNvSpPr>
+            <a:spLocks noGrp="1"/>
+          </p:cNvSpPr>
+          <p:nvPr>
+            <p:ph idx="1"/>
+          </p:nvPr>
+        </p:nvSpPr>
+        <p:spPr/>
+        <p:txBody>
+          <a:bodyPr/>
+          <a:lstStyle/>
+          <a:p>
+            <a:r>
+              <a:rPr lang="en-US" dirty="0"/>
+              <a:t>Either use </a:t>
             </a:r>
             <a:r>
               <a:rPr lang="en-US" dirty="0" err="1"/>
-              <a:t>DeepFool</a:t>
-            </a:r>
-            <a:endParaRPr lang="en-US" dirty="0"/>
-          </a:p>
-        </p:txBody>
-      </p:sp>
-      <p:sp>
-        <p:nvSpPr>
-          <p:cNvPr id="5" name="Content Placeholder 4"/>
-          <p:cNvSpPr>
-            <a:spLocks noGrp="1"/>
-          </p:cNvSpPr>
-          <p:nvPr>
-            <p:ph sz="half" idx="2"/>
-          </p:nvPr>
-        </p:nvSpPr>
-        <p:spPr/>
-        <p:txBody>
-          <a:bodyPr>
-            <a:normAutofit lnSpcReduction="10000"/>
-          </a:bodyPr>
-          <a:lstStyle/>
-          <a:p>
-            <a:r>
-              <a:rPr lang="en-US" dirty="0">
-                <a:solidFill>
-                  <a:srgbClr val="FF0000"/>
-                </a:solidFill>
-              </a:rPr>
-              <a:t>Idea:</a:t>
-            </a:r>
-          </a:p>
-          <a:p>
-            <a:r>
-              <a:rPr lang="en-US" dirty="0"/>
-              <a:t>Paper:</a:t>
-            </a:r>
-          </a:p>
-          <a:p>
-            <a:pPr lvl="1"/>
-            <a:r>
-              <a:rPr lang="en-US" dirty="0"/>
-              <a:t>A simple and accurate method to fool deep neural networks</a:t>
-            </a:r>
-          </a:p>
-          <a:p>
-            <a:pPr lvl="1"/>
-            <a:r>
-              <a:rPr lang="en-US" dirty="0"/>
-              <a:t>https://arxiv.org/abs/1511.04599</a:t>
-            </a:r>
-          </a:p>
-          <a:p>
-            <a:r>
-              <a:rPr lang="en-US" dirty="0"/>
-              <a:t>Code:</a:t>
-            </a:r>
-          </a:p>
-          <a:p>
-            <a:pPr lvl="1"/>
-            <a:r>
-              <a:rPr lang="en-US" dirty="0">
-                <a:hlinkClick r:id="rId2"/>
-              </a:rPr>
-              <a:t>https://github.com/LTS4/DeepFool</a:t>
-            </a:r>
-            <a:endParaRPr lang="en-US" dirty="0"/>
-          </a:p>
-          <a:p>
-            <a:pPr lvl="1"/>
-            <a:r>
-              <a:rPr lang="en-US" dirty="0" err="1"/>
-              <a:t>Pytorch</a:t>
-            </a:r>
-            <a:endParaRPr lang="en-US" dirty="0"/>
-          </a:p>
-        </p:txBody>
-      </p:sp>
-      <p:sp>
-        <p:nvSpPr>
-          <p:cNvPr id="6" name="Text Placeholder 5"/>
-          <p:cNvSpPr>
-            <a:spLocks noGrp="1"/>
-          </p:cNvSpPr>
-          <p:nvPr>
-            <p:ph type="body" sz="quarter" idx="3"/>
-          </p:nvPr>
-        </p:nvSpPr>
-        <p:spPr/>
-        <p:txBody>
-          <a:bodyPr/>
-          <a:lstStyle/>
-          <a:p>
-            <a:r>
-              <a:rPr lang="en-US" dirty="0"/>
-              <a:t>2. Fast Gradient Sign Method (FGSM)</a:t>
-            </a:r>
-          </a:p>
-        </p:txBody>
-      </p:sp>
-      <p:sp>
-        <p:nvSpPr>
-          <p:cNvPr id="7" name="Content Placeholder 6"/>
-          <p:cNvSpPr>
-            <a:spLocks noGrp="1"/>
-          </p:cNvSpPr>
-          <p:nvPr>
-            <p:ph sz="quarter" idx="4"/>
-          </p:nvPr>
-        </p:nvSpPr>
-        <p:spPr/>
-        <p:txBody>
-          <a:bodyPr>
-            <a:normAutofit lnSpcReduction="10000"/>
-          </a:bodyPr>
-          <a:lstStyle/>
-          <a:p>
-            <a:r>
-              <a:rPr lang="en-US" dirty="0">
-                <a:solidFill>
-                  <a:srgbClr val="FF0000"/>
-                </a:solidFill>
-              </a:rPr>
-              <a:t>Idea:</a:t>
-            </a:r>
-          </a:p>
-          <a:p>
-            <a:r>
-              <a:rPr lang="en-US" dirty="0"/>
-              <a:t>Paper:</a:t>
-            </a:r>
-          </a:p>
-          <a:p>
-            <a:pPr lvl="1"/>
-            <a:r>
-              <a:rPr lang="en-US" dirty="0"/>
-              <a:t>Explaining and Harnessing Adversarial Examples</a:t>
-            </a:r>
-          </a:p>
-          <a:p>
-            <a:pPr lvl="1"/>
-            <a:r>
-              <a:rPr lang="en-US" dirty="0"/>
-              <a:t>https://arxiv.org/abs/1412.6572</a:t>
-            </a:r>
-          </a:p>
-          <a:p>
-            <a:r>
-              <a:rPr lang="en-US" dirty="0"/>
-              <a:t>Code:</a:t>
-            </a:r>
-          </a:p>
-          <a:p>
-            <a:pPr lvl="1"/>
-            <a:r>
-              <a:rPr lang="en-US" dirty="0"/>
-              <a:t>https://github.com/gongzhitaao/tensorflow-adversarial</a:t>
-            </a:r>
-          </a:p>
-          <a:p>
-            <a:pPr lvl="1"/>
-            <a:r>
-              <a:rPr lang="en-US" dirty="0" err="1"/>
-              <a:t>Tensorflow</a:t>
-            </a:r>
-            <a:endParaRPr lang="en-US" dirty="0"/>
-          </a:p>
-          <a:p>
-            <a:pPr lvl="1"/>
-            <a:endParaRPr lang="en-US" dirty="0"/>
+              <a:t>p_inf</a:t>
+            </a:r>
+            <a:r>
+              <a:rPr lang="en-US" dirty="0"/>
+              <a:t> (already in code)</a:t>
+            </a:r>
+          </a:p>
+          <a:p>
+            <a:r>
+              <a:rPr lang="en-US" dirty="0"/>
+              <a:t>Add functions to calculate distortion</a:t>
+            </a:r>
           </a:p>
         </p:txBody>
       </p:sp>
     </p:spTree>
     <p:extLst>
       <p:ext uri="{BB962C8B-B14F-4D97-AF65-F5344CB8AC3E}">
-        <p14:creationId xmlns:p14="http://schemas.microsoft.com/office/powerpoint/2010/main" val="3202584400"/>
+        <p14:creationId xmlns:p14="http://schemas.microsoft.com/office/powerpoint/2010/main" val="3061974274"/>
       </p:ext>
     </p:extLst>
   </p:cSld>
@@ -6716,7 +7306,13 @@
       </p:grpSpPr>
       <p:sp>
         <p:nvSpPr>
-          <p:cNvPr id="2" name="Title 1"/>
+          <p:cNvPr id="2" name="Title 1">
+            <a:extLst>
+              <a:ext uri="{FF2B5EF4-FFF2-40B4-BE49-F238E27FC236}">
+                <a16:creationId xmlns:a16="http://schemas.microsoft.com/office/drawing/2014/main" id="{228CD0E4-A702-764F-B97E-357240BA042B}"/>
+              </a:ext>
+            </a:extLst>
+          </p:cNvPr>
           <p:cNvSpPr>
             <a:spLocks noGrp="1"/>
           </p:cNvSpPr>
@@ -6731,222 +7327,53 @@
           <a:p>
             <a:r>
               <a:rPr lang="en-US" dirty="0"/>
-              <a:t>Methods Summary</a:t>
-            </a:r>
-          </a:p>
-        </p:txBody>
-      </p:sp>
-      <p:sp>
-        <p:nvSpPr>
-          <p:cNvPr id="4" name="Text Placeholder 3"/>
-          <p:cNvSpPr>
-            <a:spLocks noGrp="1"/>
-          </p:cNvSpPr>
-          <p:nvPr>
-            <p:ph type="body" idx="1"/>
-          </p:nvPr>
-        </p:nvSpPr>
-        <p:spPr/>
-        <p:txBody>
-          <a:bodyPr/>
-          <a:lstStyle/>
-          <a:p>
-            <a:r>
-              <a:rPr lang="en-US" dirty="0"/>
-              <a:t>3. Iterative FGSM</a:t>
-            </a:r>
-          </a:p>
-        </p:txBody>
-      </p:sp>
-      <p:sp>
-        <p:nvSpPr>
-          <p:cNvPr id="5" name="Content Placeholder 4"/>
-          <p:cNvSpPr>
-            <a:spLocks noGrp="1"/>
-          </p:cNvSpPr>
-          <p:nvPr>
-            <p:ph sz="half" idx="2"/>
-          </p:nvPr>
-        </p:nvSpPr>
-        <p:spPr/>
-        <p:txBody>
-          <a:bodyPr>
-            <a:normAutofit fontScale="92500" lnSpcReduction="10000"/>
-          </a:bodyPr>
-          <a:lstStyle/>
-          <a:p>
-            <a:r>
-              <a:rPr lang="en-US" dirty="0">
-                <a:solidFill>
-                  <a:srgbClr val="FF0000"/>
-                </a:solidFill>
-              </a:rPr>
-              <a:t>Idea:</a:t>
-            </a:r>
-          </a:p>
-          <a:p>
-            <a:r>
-              <a:rPr lang="en-US" dirty="0"/>
-              <a:t>Paper:</a:t>
-            </a:r>
-          </a:p>
-          <a:p>
-            <a:pPr lvl="1"/>
-            <a:r>
-              <a:rPr lang="en-US" dirty="0"/>
-              <a:t>Adversarial examples in the physical world</a:t>
-            </a:r>
-          </a:p>
-          <a:p>
-            <a:pPr lvl="1"/>
-            <a:r>
-              <a:rPr lang="en-US" dirty="0"/>
-              <a:t>https://arxiv.org/abs/1607.02533</a:t>
-            </a:r>
-          </a:p>
-          <a:p>
-            <a:r>
-              <a:rPr lang="en-US" dirty="0"/>
-              <a:t>Code:</a:t>
-            </a:r>
-          </a:p>
-          <a:p>
-            <a:pPr lvl="1"/>
-            <a:r>
-              <a:rPr lang="en-US" dirty="0">
-                <a:hlinkClick r:id="rId2"/>
-              </a:rPr>
-              <a:t>https://github.com/gongzhitaao/tensorflow-adversarial</a:t>
-            </a:r>
-            <a:endParaRPr lang="en-US" dirty="0"/>
-          </a:p>
-          <a:p>
-            <a:pPr lvl="1"/>
-            <a:r>
-              <a:rPr lang="en-US" dirty="0"/>
-              <a:t>Write codes based on FGSM</a:t>
-            </a:r>
-          </a:p>
-          <a:p>
-            <a:pPr lvl="1"/>
-            <a:r>
-              <a:rPr lang="en-US" dirty="0" err="1"/>
-              <a:t>Tensorflow</a:t>
-            </a:r>
-            <a:endParaRPr lang="en-US" dirty="0"/>
-          </a:p>
-          <a:p>
-            <a:endParaRPr lang="en-US" dirty="0"/>
-          </a:p>
-        </p:txBody>
-      </p:sp>
-      <p:sp>
-        <p:nvSpPr>
-          <p:cNvPr id="6" name="Text Placeholder 5"/>
-          <p:cNvSpPr>
-            <a:spLocks noGrp="1"/>
-          </p:cNvSpPr>
-          <p:nvPr>
-            <p:ph type="body" sz="quarter" idx="3"/>
-          </p:nvPr>
-        </p:nvSpPr>
-        <p:spPr/>
-        <p:txBody>
-          <a:bodyPr/>
-          <a:lstStyle/>
-          <a:p>
-            <a:r>
-              <a:rPr lang="en-US" dirty="0"/>
-              <a:t>4. </a:t>
-            </a:r>
-            <a:r>
-              <a:rPr lang="en-US" dirty="0" err="1"/>
-              <a:t>Carlini</a:t>
-            </a:r>
-            <a:r>
-              <a:rPr lang="en-US" dirty="0"/>
-              <a:t> Wagner Attack </a:t>
-            </a:r>
-          </a:p>
-        </p:txBody>
-      </p:sp>
-      <p:sp>
-        <p:nvSpPr>
-          <p:cNvPr id="7" name="Content Placeholder 6"/>
-          <p:cNvSpPr>
-            <a:spLocks noGrp="1"/>
-          </p:cNvSpPr>
-          <p:nvPr>
-            <p:ph sz="quarter" idx="4"/>
-          </p:nvPr>
-        </p:nvSpPr>
-        <p:spPr/>
-        <p:txBody>
-          <a:bodyPr>
-            <a:normAutofit lnSpcReduction="10000"/>
-          </a:bodyPr>
-          <a:lstStyle/>
-          <a:p>
-            <a:r>
-              <a:rPr lang="en-US" dirty="0">
-                <a:solidFill>
-                  <a:srgbClr val="FF0000"/>
-                </a:solidFill>
-              </a:rPr>
-              <a:t>Idea:</a:t>
-            </a:r>
-          </a:p>
-          <a:p>
-            <a:r>
-              <a:rPr lang="en-US" dirty="0"/>
-              <a:t>Paper:</a:t>
-            </a:r>
-          </a:p>
-          <a:p>
-            <a:pPr lvl="1"/>
-            <a:r>
-              <a:rPr lang="en-US" dirty="0"/>
-              <a:t>Towards Evaluating the Robustness of Neural Networks</a:t>
-            </a:r>
-          </a:p>
-          <a:p>
-            <a:pPr lvl="1"/>
-            <a:r>
-              <a:rPr lang="en-US" dirty="0">
-                <a:hlinkClick r:id="rId3"/>
-              </a:rPr>
-              <a:t>https://arxiv.org/abs/1608.04644</a:t>
-            </a:r>
-            <a:endParaRPr lang="en-US" dirty="0"/>
-          </a:p>
-          <a:p>
-            <a:r>
-              <a:rPr lang="en-US" dirty="0"/>
-              <a:t>Code</a:t>
-            </a:r>
-          </a:p>
-          <a:p>
-            <a:pPr lvl="1"/>
-            <a:r>
-              <a:rPr lang="en-US" dirty="0">
-                <a:hlinkClick r:id="rId2"/>
-              </a:rPr>
-              <a:t>https://github.com/gongzhitaao/tensorflow-adversarial</a:t>
-            </a:r>
-            <a:r>
-              <a:rPr lang="en-US" dirty="0"/>
-              <a:t> </a:t>
-            </a:r>
-          </a:p>
-          <a:p>
-            <a:pPr lvl="1"/>
-            <a:r>
-              <a:rPr lang="en-US" dirty="0" err="1"/>
-              <a:t>Tensorflow</a:t>
-            </a:r>
-            <a:r>
-              <a:rPr lang="en-US" dirty="0"/>
-              <a:t> </a:t>
+              <a:t>What are the models (use at least one)</a:t>
+            </a:r>
+          </a:p>
+        </p:txBody>
+      </p:sp>
+      <p:sp>
+        <p:nvSpPr>
+          <p:cNvPr id="3" name="Content Placeholder 2">
+            <a:extLst>
+              <a:ext uri="{FF2B5EF4-FFF2-40B4-BE49-F238E27FC236}">
+                <a16:creationId xmlns:a16="http://schemas.microsoft.com/office/drawing/2014/main" id="{387E5CC9-5F47-5B40-8CE0-B6F5A14D5B68}"/>
+              </a:ext>
+            </a:extLst>
+          </p:cNvPr>
+          <p:cNvSpPr>
+            <a:spLocks noGrp="1"/>
+          </p:cNvSpPr>
+          <p:nvPr>
+            <p:ph idx="1"/>
+          </p:nvPr>
+        </p:nvSpPr>
+        <p:spPr/>
+        <p:txBody>
+          <a:bodyPr/>
+          <a:lstStyle/>
+          <a:p>
+            <a:r>
+              <a:rPr lang="en-US" dirty="0"/>
+              <a:t>Parameters</a:t>
+            </a:r>
+          </a:p>
+          <a:p>
+            <a:r>
+              <a:rPr lang="en-US" dirty="0"/>
+              <a:t>Training</a:t>
+            </a:r>
+          </a:p>
+          <a:p>
+            <a:r>
+              <a:rPr lang="en-US" dirty="0"/>
+              <a:t>Accuracy on test set</a:t>
+            </a:r>
+          </a:p>
+          <a:p>
+            <a:r>
+              <a:rPr lang="en-US" dirty="0"/>
+              <a:t>What data set</a:t>
             </a:r>
           </a:p>
         </p:txBody>
@@ -6954,7 +7381,7 @@
     </p:spTree>
     <p:extLst>
       <p:ext uri="{BB962C8B-B14F-4D97-AF65-F5344CB8AC3E}">
-        <p14:creationId xmlns:p14="http://schemas.microsoft.com/office/powerpoint/2010/main" val="285251880"/>
+        <p14:creationId xmlns:p14="http://schemas.microsoft.com/office/powerpoint/2010/main" val="36405737"/>
       </p:ext>
     </p:extLst>
   </p:cSld>

</xml_diff>

<commit_message>
updated ppt with next steps, still trying to fix accuracy of code
</commit_message>
<xml_diff>
--- a/Docs/Progress slides.pptx
+++ b/Docs/Progress slides.pptx
@@ -3226,45 +3226,8 @@
           <a:p>
             <a:r>
               <a:rPr lang="en-US" dirty="0"/>
-              <a:t>Have a table like slide 16 </a:t>
-            </a:r>
-            <a:r>
-              <a:rPr lang="en-US"/>
-              <a:t>or image</a:t>
-            </a:r>
-            <a:endParaRPr lang="en-US" dirty="0"/>
-          </a:p>
-        </p:txBody>
-      </p:sp>
-      <p:sp>
-        <p:nvSpPr>
-          <p:cNvPr id="4" name="TextBox 3">
-            <a:extLst>
-              <a:ext uri="{FF2B5EF4-FFF2-40B4-BE49-F238E27FC236}">
-                <a16:creationId xmlns:a16="http://schemas.microsoft.com/office/drawing/2014/main" id="{029C2145-84E1-2549-AEEF-2981EBF6F580}"/>
-              </a:ext>
-            </a:extLst>
-          </p:cNvPr>
-          <p:cNvSpPr txBox="1"/>
-          <p:nvPr/>
-        </p:nvSpPr>
-        <p:spPr>
-          <a:xfrm>
-            <a:off x="3028208" y="2078182"/>
-            <a:ext cx="184731" cy="369332"/>
-          </a:xfrm>
-          <a:prstGeom prst="rect">
-            <a:avLst/>
-          </a:prstGeom>
-          <a:noFill/>
-        </p:spPr>
-        <p:txBody>
-          <a:bodyPr wrap="none" rtlCol="0">
-            <a:spAutoFit/>
-          </a:bodyPr>
-          <a:lstStyle/>
-          <a:p>
-            <a:endParaRPr lang="en-US" dirty="0"/>
+              <a:t>Have a table like slide 16 or image</a:t>
+            </a:r>
           </a:p>
         </p:txBody>
       </p:sp>
@@ -7376,6 +7339,39 @@
               <a:t>What data set</a:t>
             </a:r>
           </a:p>
+          <a:p>
+            <a:r>
+              <a:rPr lang="en-US" dirty="0"/>
+              <a:t>Maybe switch </a:t>
+            </a:r>
+            <a:r>
+              <a:rPr lang="en-US" dirty="0" err="1"/>
+              <a:t>elu</a:t>
+            </a:r>
+            <a:r>
+              <a:rPr lang="en-US" dirty="0"/>
+              <a:t>? </a:t>
+            </a:r>
+            <a:r>
+              <a:rPr lang="en-US" dirty="0" err="1"/>
+              <a:t>Relu</a:t>
+            </a:r>
+            <a:r>
+              <a:rPr lang="en-US" dirty="0"/>
+              <a:t> is best? Leaky </a:t>
+            </a:r>
+            <a:r>
+              <a:rPr lang="en-US" dirty="0" err="1"/>
+              <a:t>relu</a:t>
+            </a:r>
+            <a:r>
+              <a:rPr lang="en-US" dirty="0"/>
+              <a:t>?</a:t>
+            </a:r>
+          </a:p>
+          <a:p>
+            <a:endParaRPr lang="en-US" dirty="0"/>
+          </a:p>
         </p:txBody>
       </p:sp>
     </p:spTree>

</xml_diff>